<commit_message>
WHY WAS THIS THE OLDER SLIDE??
</commit_message>
<xml_diff>
--- a/Hardware_description.pptx
+++ b/Hardware_description.pptx
@@ -257,11 +257,26 @@
   </pc:docChgLst>
   <pc:docChgLst>
     <pc:chgData name="Carlo Emilio Montanari" userId="c30cf62a-023f-42a5-9fb8-249fbb46a2c7" providerId="ADAL" clId="{DABDDCAC-99A0-44EF-B8ED-C3208A30340E}"/>
-    <pc:docChg chg="addSld delSld modSld">
-      <pc:chgData name="Carlo Emilio Montanari" userId="c30cf62a-023f-42a5-9fb8-249fbb46a2c7" providerId="ADAL" clId="{DABDDCAC-99A0-44EF-B8ED-C3208A30340E}" dt="2018-12-16T23:00:52.340" v="87" actId="2696"/>
+    <pc:docChg chg="custSel addSld delSld modSld">
+      <pc:chgData name="Carlo Emilio Montanari" userId="c30cf62a-023f-42a5-9fb8-249fbb46a2c7" providerId="ADAL" clId="{DABDDCAC-99A0-44EF-B8ED-C3208A30340E}" dt="2018-12-17T10:42:46.783" v="341" actId="20577"/>
       <pc:docMkLst>
         <pc:docMk/>
       </pc:docMkLst>
+      <pc:sldChg chg="modSp">
+        <pc:chgData name="Carlo Emilio Montanari" userId="c30cf62a-023f-42a5-9fb8-249fbb46a2c7" providerId="ADAL" clId="{DABDDCAC-99A0-44EF-B8ED-C3208A30340E}" dt="2018-12-17T10:42:46.783" v="341" actId="20577"/>
+        <pc:sldMkLst>
+          <pc:docMk/>
+          <pc:sldMk cId="2870039045" sldId="258"/>
+        </pc:sldMkLst>
+        <pc:spChg chg="mod">
+          <ac:chgData name="Carlo Emilio Montanari" userId="c30cf62a-023f-42a5-9fb8-249fbb46a2c7" providerId="ADAL" clId="{DABDDCAC-99A0-44EF-B8ED-C3208A30340E}" dt="2018-12-17T10:42:46.783" v="341" actId="20577"/>
+          <ac:spMkLst>
+            <pc:docMk/>
+            <pc:sldMk cId="2870039045" sldId="258"/>
+            <ac:spMk id="4" creationId="{CCD45C55-CEF2-4A7F-A1EC-DD8A142D35E1}"/>
+          </ac:spMkLst>
+        </pc:spChg>
+      </pc:sldChg>
       <pc:sldChg chg="modSp add del">
         <pc:chgData name="Carlo Emilio Montanari" userId="c30cf62a-023f-42a5-9fb8-249fbb46a2c7" providerId="ADAL" clId="{DABDDCAC-99A0-44EF-B8ED-C3208A30340E}" dt="2018-12-16T23:00:52.301" v="85" actId="2696"/>
         <pc:sldMkLst>
@@ -15033,7 +15048,7 @@
         <p:spPr/>
         <p:txBody>
           <a:bodyPr>
-            <a:normAutofit fontScale="62500" lnSpcReduction="20000"/>
+            <a:normAutofit fontScale="77500" lnSpcReduction="20000"/>
           </a:bodyPr>
           <a:lstStyle/>
           <a:p>
@@ -15044,15 +15059,23 @@
               <a:rPr lang="en-US" b="1" dirty="0"/>
               <a:t>Main idea behind it</a:t>
             </a:r>
-            <a:br>
-              <a:rPr lang="en-US" b="1" dirty="0"/>
-            </a:br>
-            <a:br>
-              <a:rPr lang="en-US" b="1" dirty="0"/>
-            </a:br>
+          </a:p>
+          <a:p>
+            <a:pPr marL="0" indent="0">
+              <a:buNone/>
+            </a:pPr>
             <a:r>
               <a:rPr lang="en-US" dirty="0"/>
               <a:t>An IR led shines on a reflective/absorbing surface. A photoresistor then changes its resistance depending on the received IR radiation and the resulting voltage is then compared by an LM393 dual comparator chip.</a:t>
+            </a:r>
+          </a:p>
+          <a:p>
+            <a:pPr marL="0" indent="0">
+              <a:buNone/>
+            </a:pPr>
+            <a:r>
+              <a:rPr lang="en-US" b="1" dirty="0"/>
+              <a:t>Interface</a:t>
             </a:r>
             <a:br>
               <a:rPr lang="en-US" dirty="0"/>
@@ -15061,38 +15084,17 @@
               <a:rPr lang="en-US" dirty="0"/>
             </a:br>
             <a:r>
-              <a:rPr lang="en-US" b="1" dirty="0"/>
-              <a:t>Observations on the schematics</a:t>
-            </a:r>
-            <a:br>
-              <a:rPr lang="en-US" b="1" dirty="0"/>
-            </a:br>
-            <a:br>
-              <a:rPr lang="en-US" b="1" dirty="0"/>
-            </a:br>
-            <a:r>
               <a:rPr lang="en-US" dirty="0"/>
-              <a:t>Block A contains the U2 module that has the IR led and the Photoresistor. Block B contains a simple comparing circuit with two status led (D1 and D2) and one potentiometer R3 for manual regulating the threshold of the entire sensor. D1 indicates whether the sensor is powered up or not. D2 indicates if the signal is positive (SIG=VCC). LM393 is constituted by 2 standard low offset voltage comparators (only one is used) that returns VCC as +VCC and GND as -VCC, working indeed as a sort of Boolean operator. Capacitors C1 and C2 are placed in order to maintain SIG and 1IN- stable in case of power supplying problems.</a:t>
-            </a:r>
-            <a:br>
+              <a:t>A standard IR Tracking Sensor has a 3 Pin interface. VCC and GND for power suppling and a SIG pin for checking if the reflectance is beyond the threshold.</a:t>
+            </a:r>
+          </a:p>
+          <a:p>
+            <a:pPr marL="0" indent="0">
+              <a:buNone/>
+            </a:pPr>
+            <a:r>
               <a:rPr lang="en-US" dirty="0"/>
-            </a:br>
-            <a:br>
-              <a:rPr lang="en-US" dirty="0"/>
-            </a:br>
-            <a:r>
-              <a:rPr lang="en-US" b="1" dirty="0"/>
-              <a:t>Remarks</a:t>
-            </a:r>
-            <a:br>
-              <a:rPr lang="en-US" dirty="0"/>
-            </a:br>
-            <a:br>
-              <a:rPr lang="en-US" dirty="0"/>
-            </a:br>
-            <a:r>
-              <a:rPr lang="en-US" dirty="0"/>
-              <a:t>Our IR Tracking Sensor Module has a fourth pin that allows the user to read the voltage signal at node 4 in block A. However, we do not use that pin in our project.</a:t>
+              <a:t>Our IR Tracking Sensor Module has also a fourth pin that allows the user to read the actual voltage signal of the sensor. However, we do not use that pin in our project.</a:t>
             </a:r>
             <a:endParaRPr lang="it-IT" dirty="0"/>
           </a:p>

</xml_diff>